<commit_message>
Removed Tag Bus mentions
Removed mentions of Tag Bus.

Moved application example to before code deep-dive in the Introduction.
</commit_message>
<xml_diff>
--- a/Trunk/Presentations/C_DCAF Under the Hood.pptx
+++ b/Trunk/Presentations/C_DCAF Under the Hood.pptx
@@ -2111,20 +2111,20 @@
             <ac:inkMk id="4" creationId="{C26B5CE0-150E-4EBC-9B48-7C61AA783615}"/>
           </ac:inkMkLst>
         </pc:inkChg>
+        <pc:inkChg chg="add">
+          <ac:chgData name="Benjamin Celis" userId="de06cec6-6a32-48fe-a866-6838d7403f30" providerId="ADAL" clId="{DE5B90EA-8F23-459A-8886-CA8644FB5E45}" dt="2018-05-10T14:55:09.492" v="1852" actId="20577"/>
+          <ac:inkMkLst>
+            <pc:docMk/>
+            <pc:sldMk cId="1087974841" sldId="349"/>
+            <ac:inkMk id="5" creationId="{4E644229-E31E-464E-A51D-BE2A45D5C898}"/>
+          </ac:inkMkLst>
+        </pc:inkChg>
         <pc:inkChg chg="add del">
           <ac:chgData name="Benjamin Celis" userId="de06cec6-6a32-48fe-a866-6838d7403f30" providerId="ADAL" clId="{DE5B90EA-8F23-459A-8886-CA8644FB5E45}" dt="2018-05-10T14:54:44.477" v="1837" actId="20577"/>
           <ac:inkMkLst>
             <pc:docMk/>
             <pc:sldMk cId="1087974841" sldId="349"/>
             <ac:inkMk id="5" creationId="{7F9907BE-FAB7-4A3B-884C-A3D83D00D47B}"/>
-          </ac:inkMkLst>
-        </pc:inkChg>
-        <pc:inkChg chg="add">
-          <ac:chgData name="Benjamin Celis" userId="de06cec6-6a32-48fe-a866-6838d7403f30" providerId="ADAL" clId="{DE5B90EA-8F23-459A-8886-CA8644FB5E45}" dt="2018-05-10T14:55:09.492" v="1852" actId="20577"/>
-          <ac:inkMkLst>
-            <pc:docMk/>
-            <pc:sldMk cId="1087974841" sldId="349"/>
-            <ac:inkMk id="5" creationId="{4E644229-E31E-464E-A51D-BE2A45D5C898}"/>
           </ac:inkMkLst>
         </pc:inkChg>
         <pc:inkChg chg="add del">
@@ -8295,7 +8295,7 @@
           <a:p>
             <a:fld id="{54520A66-B70D-4F81-A7E5-A836D99EF20F}" type="datetimeFigureOut">
               <a:rPr lang="en-US" smtClean="0"/>
-              <a:t>2018-06-29</a:t>
+              <a:t>2018-09-28</a:t>
             </a:fld>
             <a:endParaRPr lang="en-US" dirty="0"/>
           </a:p>
@@ -17983,31 +17983,6 @@
           </a:p>
         </p:txBody>
       </p:sp>
-      <p:sp>
-        <p:nvSpPr>
-          <p:cNvPr id="3" name="Content Placeholder 2">
-            <a:extLst>
-              <a:ext uri="{FF2B5EF4-FFF2-40B4-BE49-F238E27FC236}">
-                <a16:creationId xmlns:a16="http://schemas.microsoft.com/office/drawing/2014/main" id="{A1F4E2B7-BC9A-4A5A-952C-34DF65BDC54D}"/>
-              </a:ext>
-            </a:extLst>
-          </p:cNvPr>
-          <p:cNvSpPr>
-            <a:spLocks noGrp="1"/>
-          </p:cNvSpPr>
-          <p:nvPr>
-            <p:ph idx="1"/>
-          </p:nvPr>
-        </p:nvSpPr>
-        <p:spPr/>
-        <p:txBody>
-          <a:bodyPr/>
-          <a:lstStyle/>
-          <a:p>
-            <a:endParaRPr lang="en-US" dirty="0"/>
-          </a:p>
-        </p:txBody>
-      </p:sp>
       <p:pic>
         <p:nvPicPr>
           <p:cNvPr id="4" name="Picture 3">
@@ -21718,10 +21693,9 @@
           </a:p>
           <a:p>
             <a:r>
-              <a:rPr lang="en-US"/>
+              <a:rPr lang="en-US" dirty="0"/>
               <a:t>OPCUA Client</a:t>
             </a:r>
-            <a:endParaRPr lang="en-US" dirty="0"/>
           </a:p>
           <a:p>
             <a:r>
@@ -21751,7 +21725,7 @@
 </file>
 
 <file path=ppt/slides/slide34.xml><?xml version="1.0" encoding="utf-8"?>
-<p:sld xmlns:a="http://schemas.openxmlformats.org/drawingml/2006/main" xmlns:r="http://schemas.openxmlformats.org/officeDocument/2006/relationships" xmlns:p="http://schemas.openxmlformats.org/presentationml/2006/main">
+<p:sld xmlns:a="http://schemas.openxmlformats.org/drawingml/2006/main" xmlns:r="http://schemas.openxmlformats.org/officeDocument/2006/relationships" xmlns:p="http://schemas.openxmlformats.org/presentationml/2006/main" show="0">
   <p:cSld>
     <p:spTree>
       <p:nvGrpSpPr>
@@ -21920,7 +21894,12 @@
             <p:ph idx="1"/>
           </p:nvPr>
         </p:nvSpPr>
-        <p:spPr/>
+        <p:spPr>
+          <a:xfrm>
+            <a:off x="637778" y="1121384"/>
+            <a:ext cx="10887473" cy="4949008"/>
+          </a:xfrm>
+        </p:spPr>
         <p:txBody>
           <a:bodyPr/>
           <a:lstStyle/>
@@ -21962,6 +21941,13 @@
             <a:r>
               <a:rPr lang="en-US" dirty="0"/>
               <a:t>Pull requests welcome!</a:t>
+            </a:r>
+          </a:p>
+          <a:p>
+            <a:pPr lvl="1"/>
+            <a:r>
+              <a:rPr lang="en-US" dirty="0"/>
+              <a:t>Includes documentation repository</a:t>
             </a:r>
           </a:p>
           <a:p>
@@ -21985,7 +21971,7 @@
         </p:blipFill>
         <p:spPr>
           <a:xfrm>
-            <a:off x="5518300" y="365760"/>
+            <a:off x="5518300" y="1475590"/>
             <a:ext cx="6006951" cy="3906820"/>
           </a:xfrm>
           <a:prstGeom prst="rect">
@@ -23290,7 +23276,7 @@
             <a:pPr marL="243205" indent="-243205"/>
             <a:r>
               <a:rPr lang="en-US" b="1" dirty="0"/>
-              <a:t>You don’t need to use DCAF you can use what we learned creating DCAF</a:t>
+              <a:t>You don’t need to use DCAF but you can use what we learned creating it</a:t>
             </a:r>
           </a:p>
           <a:p>

</xml_diff>